<commit_message>
fixed the powerpoint presentation
</commit_message>
<xml_diff>
--- a/DBMSpresentation.pptx
+++ b/DBMSpresentation.pptx
@@ -6,14 +6,12 @@
   </p:sldMasterIdLst>
   <p:sldIdLst>
     <p:sldId id="256" r:id="rId2"/>
-    <p:sldId id="257" r:id="rId3"/>
-    <p:sldId id="264" r:id="rId4"/>
-    <p:sldId id="258" r:id="rId5"/>
-    <p:sldId id="259" r:id="rId6"/>
-    <p:sldId id="260" r:id="rId7"/>
-    <p:sldId id="262" r:id="rId8"/>
-    <p:sldId id="263" r:id="rId9"/>
-    <p:sldId id="265" r:id="rId10"/>
+    <p:sldId id="264" r:id="rId3"/>
+    <p:sldId id="266" r:id="rId4"/>
+    <p:sldId id="260" r:id="rId5"/>
+    <p:sldId id="262" r:id="rId6"/>
+    <p:sldId id="263" r:id="rId7"/>
+    <p:sldId id="265" r:id="rId8"/>
   </p:sldIdLst>
   <p:sldSz cx="12192000" cy="6858000"/>
   <p:notesSz cx="6858000" cy="9144000"/>
@@ -112,6 +110,11 @@
       </a:defRPr>
     </a:lvl9pPr>
   </p:defaultTextStyle>
+  <p:extLst>
+    <p:ext uri="{EFAFB233-063F-42B5-8137-9DF3F51BA10A}">
+      <p15:sldGuideLst xmlns:p15="http://schemas.microsoft.com/office/powerpoint/2012/main"/>
+    </p:ext>
+  </p:extLst>
 </p:presentation>
 </file>
 
@@ -306,7 +309,7 @@
           <a:p>
             <a:fld id="{C373EBDF-22AC-42C7-AECE-C53D2A6BC3DF}" type="datetimeFigureOut">
               <a:rPr lang="en-US" smtClean="0"/>
-              <a:t>11/27/2017</a:t>
+              <a:t>11/28/2017</a:t>
             </a:fld>
             <a:endParaRPr lang="en-US"/>
           </a:p>
@@ -742,7 +745,7 @@
           <a:p>
             <a:fld id="{C373EBDF-22AC-42C7-AECE-C53D2A6BC3DF}" type="datetimeFigureOut">
               <a:rPr lang="en-US" smtClean="0"/>
-              <a:t>11/27/2017</a:t>
+              <a:t>11/28/2017</a:t>
             </a:fld>
             <a:endParaRPr lang="en-US"/>
           </a:p>
@@ -992,7 +995,7 @@
           <a:p>
             <a:fld id="{C373EBDF-22AC-42C7-AECE-C53D2A6BC3DF}" type="datetimeFigureOut">
               <a:rPr lang="en-US" smtClean="0"/>
-              <a:t>11/27/2017</a:t>
+              <a:t>11/28/2017</a:t>
             </a:fld>
             <a:endParaRPr lang="en-US"/>
           </a:p>
@@ -1300,7 +1303,7 @@
           <a:p>
             <a:fld id="{C373EBDF-22AC-42C7-AECE-C53D2A6BC3DF}" type="datetimeFigureOut">
               <a:rPr lang="en-US" smtClean="0"/>
-              <a:t>11/27/2017</a:t>
+              <a:t>11/28/2017</a:t>
             </a:fld>
             <a:endParaRPr lang="en-US"/>
           </a:p>
@@ -1618,7 +1621,7 @@
           <a:p>
             <a:fld id="{C373EBDF-22AC-42C7-AECE-C53D2A6BC3DF}" type="datetimeFigureOut">
               <a:rPr lang="en-US" smtClean="0"/>
-              <a:t>11/27/2017</a:t>
+              <a:t>11/28/2017</a:t>
             </a:fld>
             <a:endParaRPr lang="en-US"/>
           </a:p>
@@ -1920,7 +1923,7 @@
           <a:p>
             <a:fld id="{C373EBDF-22AC-42C7-AECE-C53D2A6BC3DF}" type="datetimeFigureOut">
               <a:rPr lang="en-US" smtClean="0"/>
-              <a:t>11/27/2017</a:t>
+              <a:t>11/28/2017</a:t>
             </a:fld>
             <a:endParaRPr lang="en-US"/>
           </a:p>
@@ -2287,7 +2290,7 @@
           <a:p>
             <a:fld id="{C373EBDF-22AC-42C7-AECE-C53D2A6BC3DF}" type="datetimeFigureOut">
               <a:rPr lang="en-US" smtClean="0"/>
-              <a:t>11/27/2017</a:t>
+              <a:t>11/28/2017</a:t>
             </a:fld>
             <a:endParaRPr lang="en-US"/>
           </a:p>
@@ -2461,7 +2464,7 @@
           <a:p>
             <a:fld id="{C373EBDF-22AC-42C7-AECE-C53D2A6BC3DF}" type="datetimeFigureOut">
               <a:rPr lang="en-US" smtClean="0"/>
-              <a:t>11/27/2017</a:t>
+              <a:t>11/28/2017</a:t>
             </a:fld>
             <a:endParaRPr lang="en-US"/>
           </a:p>
@@ -2641,7 +2644,7 @@
           <a:p>
             <a:fld id="{C373EBDF-22AC-42C7-AECE-C53D2A6BC3DF}" type="datetimeFigureOut">
               <a:rPr lang="en-US" smtClean="0"/>
-              <a:t>11/27/2017</a:t>
+              <a:t>11/28/2017</a:t>
             </a:fld>
             <a:endParaRPr lang="en-US"/>
           </a:p>
@@ -2811,7 +2814,7 @@
           <a:p>
             <a:fld id="{C373EBDF-22AC-42C7-AECE-C53D2A6BC3DF}" type="datetimeFigureOut">
               <a:rPr lang="en-US" smtClean="0"/>
-              <a:t>11/27/2017</a:t>
+              <a:t>11/28/2017</a:t>
             </a:fld>
             <a:endParaRPr lang="en-US"/>
           </a:p>
@@ -3061,7 +3064,7 @@
           <a:p>
             <a:fld id="{C373EBDF-22AC-42C7-AECE-C53D2A6BC3DF}" type="datetimeFigureOut">
               <a:rPr lang="en-US" smtClean="0"/>
-              <a:t>11/27/2017</a:t>
+              <a:t>11/28/2017</a:t>
             </a:fld>
             <a:endParaRPr lang="en-US"/>
           </a:p>
@@ -3297,7 +3300,7 @@
           <a:p>
             <a:fld id="{C373EBDF-22AC-42C7-AECE-C53D2A6BC3DF}" type="datetimeFigureOut">
               <a:rPr lang="en-US" smtClean="0"/>
-              <a:t>11/27/2017</a:t>
+              <a:t>11/28/2017</a:t>
             </a:fld>
             <a:endParaRPr lang="en-US"/>
           </a:p>
@@ -3679,7 +3682,7 @@
           <a:p>
             <a:fld id="{C373EBDF-22AC-42C7-AECE-C53D2A6BC3DF}" type="datetimeFigureOut">
               <a:rPr lang="en-US" smtClean="0"/>
-              <a:t>11/27/2017</a:t>
+              <a:t>11/28/2017</a:t>
             </a:fld>
             <a:endParaRPr lang="en-US"/>
           </a:p>
@@ -3797,7 +3800,7 @@
           <a:p>
             <a:fld id="{C373EBDF-22AC-42C7-AECE-C53D2A6BC3DF}" type="datetimeFigureOut">
               <a:rPr lang="en-US" smtClean="0"/>
-              <a:t>11/27/2017</a:t>
+              <a:t>11/28/2017</a:t>
             </a:fld>
             <a:endParaRPr lang="en-US"/>
           </a:p>
@@ -3892,7 +3895,7 @@
           <a:p>
             <a:fld id="{C373EBDF-22AC-42C7-AECE-C53D2A6BC3DF}" type="datetimeFigureOut">
               <a:rPr lang="en-US" smtClean="0"/>
-              <a:t>11/27/2017</a:t>
+              <a:t>11/28/2017</a:t>
             </a:fld>
             <a:endParaRPr lang="en-US"/>
           </a:p>
@@ -4147,7 +4150,7 @@
           <a:p>
             <a:fld id="{C373EBDF-22AC-42C7-AECE-C53D2A6BC3DF}" type="datetimeFigureOut">
               <a:rPr lang="en-US" smtClean="0"/>
-              <a:t>11/27/2017</a:t>
+              <a:t>11/28/2017</a:t>
             </a:fld>
             <a:endParaRPr lang="en-US"/>
           </a:p>
@@ -4430,7 +4433,7 @@
           <a:p>
             <a:fld id="{C373EBDF-22AC-42C7-AECE-C53D2A6BC3DF}" type="datetimeFigureOut">
               <a:rPr lang="en-US" smtClean="0"/>
-              <a:t>11/27/2017</a:t>
+              <a:t>11/28/2017</a:t>
             </a:fld>
             <a:endParaRPr lang="en-US"/>
           </a:p>
@@ -4836,7 +4839,7 @@
           <a:p>
             <a:fld id="{C373EBDF-22AC-42C7-AECE-C53D2A6BC3DF}" type="datetimeFigureOut">
               <a:rPr lang="en-US" smtClean="0"/>
-              <a:t>11/27/2017</a:t>
+              <a:t>11/28/2017</a:t>
             </a:fld>
             <a:endParaRPr lang="en-US"/>
           </a:p>
@@ -5373,34 +5376,6 @@
       </p:grpSpPr>
       <p:sp>
         <p:nvSpPr>
-          <p:cNvPr id="2" name="Title 1"/>
-          <p:cNvSpPr>
-            <a:spLocks noGrp="1"/>
-          </p:cNvSpPr>
-          <p:nvPr>
-            <p:ph type="ctrTitle"/>
-          </p:nvPr>
-        </p:nvSpPr>
-        <p:spPr>
-          <a:xfrm>
-            <a:off x="684212" y="1457231"/>
-            <a:ext cx="8684640" cy="2971801"/>
-          </a:xfrm>
-        </p:spPr>
-        <p:txBody>
-          <a:bodyPr/>
-          <a:lstStyle/>
-          <a:p>
-            <a:r>
-              <a:rPr lang="en-US" dirty="0" smtClean="0"/>
-              <a:t>Make Twitter Great Again</a:t>
-            </a:r>
-            <a:endParaRPr lang="en-US" dirty="0"/>
-          </a:p>
-        </p:txBody>
-      </p:sp>
-      <p:sp>
-        <p:nvSpPr>
           <p:cNvPr id="3" name="Subtitle 2"/>
           <p:cNvSpPr>
             <a:spLocks noGrp="1"/>
@@ -5467,7 +5442,7 @@
         </p:blipFill>
         <p:spPr>
           <a:xfrm>
-            <a:off x="5253695" y="0"/>
+            <a:off x="5253694" y="0"/>
             <a:ext cx="6938306" cy="3642610"/>
           </a:xfrm>
           <a:prstGeom prst="rect">
@@ -5475,6 +5450,45 @@
           </a:prstGeom>
         </p:spPr>
       </p:pic>
+      <p:sp>
+        <p:nvSpPr>
+          <p:cNvPr id="2" name="Title 1"/>
+          <p:cNvSpPr>
+            <a:spLocks noGrp="1"/>
+          </p:cNvSpPr>
+          <p:nvPr>
+            <p:ph type="ctrTitle"/>
+          </p:nvPr>
+        </p:nvSpPr>
+        <p:spPr>
+          <a:xfrm>
+            <a:off x="684212" y="1457231"/>
+            <a:ext cx="8684640" cy="2971801"/>
+          </a:xfrm>
+        </p:spPr>
+        <p:txBody>
+          <a:bodyPr/>
+          <a:lstStyle/>
+          <a:p>
+            <a:r>
+              <a:rPr lang="en-US" dirty="0" smtClean="0"/>
+              <a:t>Make Twitter Great </a:t>
+            </a:r>
+            <a:r>
+              <a:rPr lang="en-US" dirty="0" smtClean="0"/>
+              <a:t>Again</a:t>
+            </a:r>
+            <a:br>
+              <a:rPr lang="en-US" dirty="0" smtClean="0"/>
+            </a:br>
+            <a:r>
+              <a:rPr lang="en-US" dirty="0" smtClean="0"/>
+              <a:t>Group 17</a:t>
+            </a:r>
+            <a:endParaRPr lang="en-US" dirty="0"/>
+          </a:p>
+        </p:txBody>
+      </p:sp>
     </p:spTree>
     <p:extLst>
       <p:ext uri="{BB962C8B-B14F-4D97-AF65-F5344CB8AC3E}">
@@ -5515,57 +5529,64 @@
             <p:ph type="title"/>
           </p:nvPr>
         </p:nvSpPr>
-        <p:spPr>
-          <a:xfrm>
-            <a:off x="639241" y="5350933"/>
-            <a:ext cx="8534400" cy="1507067"/>
-          </a:xfrm>
-        </p:spPr>
+        <p:spPr/>
         <p:txBody>
           <a:bodyPr/>
           <a:lstStyle/>
           <a:p>
             <a:r>
               <a:rPr lang="en-US" dirty="0" smtClean="0"/>
-              <a:t>Lets begin</a:t>
+              <a:t>Project Description</a:t>
             </a:r>
             <a:endParaRPr lang="en-US" dirty="0"/>
           </a:p>
         </p:txBody>
       </p:sp>
-      <p:pic>
-        <p:nvPicPr>
-          <p:cNvPr id="4" name="Content Placeholder 3"/>
-          <p:cNvPicPr>
-            <a:picLocks noGrp="1" noChangeAspect="1"/>
-          </p:cNvPicPr>
+      <p:sp>
+        <p:nvSpPr>
+          <p:cNvPr id="3" name="Content Placeholder 2"/>
+          <p:cNvSpPr>
+            <a:spLocks noGrp="1"/>
+          </p:cNvSpPr>
           <p:nvPr>
             <p:ph idx="1"/>
           </p:nvPr>
-        </p:nvPicPr>
-        <p:blipFill>
-          <a:blip r:embed="rId2">
-            <a:extLst>
-              <a:ext uri="{28A0092B-C50C-407E-A947-70E740481C1C}">
-                <a14:useLocalDpi xmlns:a14="http://schemas.microsoft.com/office/drawing/2010/main" val="0"/>
-              </a:ext>
-            </a:extLst>
-          </a:blip>
-          <a:stretch>
-            <a:fillRect/>
-          </a:stretch>
-        </p:blipFill>
-        <p:spPr>
-          <a:xfrm>
-            <a:off x="0" y="0"/>
-            <a:ext cx="12168265" cy="5606321"/>
-          </a:xfrm>
-        </p:spPr>
-      </p:pic>
+        </p:nvSpPr>
+        <p:spPr/>
+        <p:txBody>
+          <a:bodyPr/>
+          <a:lstStyle/>
+          <a:p>
+            <a:r>
+              <a:rPr lang="en-US" dirty="0" smtClean="0"/>
+              <a:t>Gather metadata of Trump’s Tweets</a:t>
+            </a:r>
+          </a:p>
+          <a:p>
+            <a:r>
+              <a:rPr lang="en-US" dirty="0" smtClean="0"/>
+              <a:t>Store in a Database</a:t>
+            </a:r>
+          </a:p>
+          <a:p>
+            <a:r>
+              <a:rPr lang="en-US" dirty="0" smtClean="0"/>
+              <a:t>Present robust yet simple interface to stored information</a:t>
+            </a:r>
+          </a:p>
+          <a:p>
+            <a:r>
+              <a:rPr lang="en-US" dirty="0" smtClean="0"/>
+              <a:t>Allows Users to interpret data for their own informed opinion</a:t>
+            </a:r>
+            <a:endParaRPr lang="en-US" dirty="0"/>
+          </a:p>
+        </p:txBody>
+      </p:sp>
     </p:spTree>
     <p:extLst>
       <p:ext uri="{BB962C8B-B14F-4D97-AF65-F5344CB8AC3E}">
-        <p14:creationId xmlns:p14="http://schemas.microsoft.com/office/powerpoint/2010/main" val="2700920870"/>
+        <p14:creationId xmlns:p14="http://schemas.microsoft.com/office/powerpoint/2010/main" val="3089864837"/>
       </p:ext>
     </p:extLst>
   </p:cSld>
@@ -5609,7 +5630,7 @@
           <a:p>
             <a:r>
               <a:rPr lang="en-US" dirty="0" smtClean="0"/>
-              <a:t>Project Description</a:t>
+              <a:t>Tools used</a:t>
             </a:r>
             <a:endParaRPr lang="en-US" dirty="0"/>
           </a:p>
@@ -5632,95 +5653,61 @@
           <a:p>
             <a:r>
               <a:rPr lang="en-US" dirty="0" smtClean="0"/>
-              <a:t>Gather metadata of Trump’s Tweets</a:t>
-            </a:r>
-          </a:p>
-          <a:p>
+              <a:t>Back-End: </a:t>
+            </a:r>
+          </a:p>
+          <a:p>
+            <a:pPr lvl="1"/>
             <a:r>
               <a:rPr lang="en-US" dirty="0" smtClean="0"/>
-              <a:t>Store in a Database</a:t>
-            </a:r>
-          </a:p>
-          <a:p>
+              <a:t>Python, Flask, </a:t>
+            </a:r>
+            <a:r>
+              <a:rPr lang="en-US" dirty="0" err="1" smtClean="0"/>
+              <a:t>SQLAlchemy</a:t>
+            </a:r>
             <a:r>
               <a:rPr lang="en-US" dirty="0" smtClean="0"/>
-              <a:t>Present robust yet simple interface to stored information</a:t>
-            </a:r>
-          </a:p>
-          <a:p>
+              <a:t>, PostgreSQL, </a:t>
+            </a:r>
+            <a:r>
+              <a:rPr lang="en-US" dirty="0" err="1" smtClean="0"/>
+              <a:t>Tweepy</a:t>
+            </a:r>
+            <a:r>
+              <a:rPr lang="en-US" dirty="0"/>
+              <a:t> </a:t>
+            </a:r>
             <a:r>
               <a:rPr lang="en-US" dirty="0" smtClean="0"/>
-              <a:t>Allows Users to interpret data for their own informed opinion</a:t>
-            </a:r>
-            <a:endParaRPr lang="en-US" dirty="0"/>
-          </a:p>
-        </p:txBody>
-      </p:sp>
-    </p:spTree>
-    <p:extLst>
-      <p:ext uri="{BB962C8B-B14F-4D97-AF65-F5344CB8AC3E}">
-        <p14:creationId xmlns:p14="http://schemas.microsoft.com/office/powerpoint/2010/main" val="3089864837"/>
-      </p:ext>
-    </p:extLst>
-  </p:cSld>
-  <p:clrMapOvr>
-    <a:masterClrMapping/>
-  </p:clrMapOvr>
-</p:sld>
-</file>
-
-<file path=ppt/slides/slide4.xml><?xml version="1.0" encoding="utf-8"?>
-<p:sld xmlns:a="http://schemas.openxmlformats.org/drawingml/2006/main" xmlns:r="http://schemas.openxmlformats.org/officeDocument/2006/relationships" xmlns:p="http://schemas.openxmlformats.org/presentationml/2006/main">
-  <p:cSld>
-    <p:spTree>
-      <p:nvGrpSpPr>
-        <p:cNvPr id="1" name=""/>
-        <p:cNvGrpSpPr/>
-        <p:nvPr/>
-      </p:nvGrpSpPr>
-      <p:grpSpPr>
-        <a:xfrm>
-          <a:off x="0" y="0"/>
-          <a:ext cx="0" cy="0"/>
-          <a:chOff x="0" y="0"/>
-          <a:chExt cx="0" cy="0"/>
-        </a:xfrm>
-      </p:grpSpPr>
-      <p:sp>
-        <p:nvSpPr>
-          <p:cNvPr id="2" name="Title 1"/>
-          <p:cNvSpPr>
-            <a:spLocks noGrp="1"/>
-          </p:cNvSpPr>
-          <p:nvPr>
-            <p:ph type="title"/>
-          </p:nvPr>
-        </p:nvSpPr>
-        <p:spPr/>
-        <p:txBody>
-          <a:bodyPr/>
-          <a:lstStyle/>
+              <a:t>(python twitter API), Pandas</a:t>
+            </a:r>
+          </a:p>
           <a:p>
             <a:r>
               <a:rPr lang="en-US" dirty="0" smtClean="0"/>
-              <a:t>Back-end</a:t>
-            </a:r>
-            <a:endParaRPr lang="en-US" dirty="0"/>
+              <a:t>Front-End:</a:t>
+            </a:r>
+          </a:p>
+          <a:p>
+            <a:pPr lvl="1"/>
+            <a:r>
+              <a:rPr lang="en-US" dirty="0" smtClean="0"/>
+              <a:t>HTML, CSS, JS, Bootstrap </a:t>
+            </a:r>
           </a:p>
         </p:txBody>
       </p:sp>
       <p:pic>
         <p:nvPicPr>
-          <p:cNvPr id="6" name="Content Placeholder 5"/>
+          <p:cNvPr id="4" name="Content Placeholder 5"/>
           <p:cNvPicPr>
-            <a:picLocks noGrp="1" noChangeAspect="1"/>
+            <a:picLocks noChangeAspect="1"/>
           </p:cNvPicPr>
-          <p:nvPr>
-            <p:ph idx="1"/>
-          </p:nvPr>
+          <p:nvPr/>
         </p:nvPicPr>
         <p:blipFill>
-          <a:blip r:embed="rId2">
+          <a:blip r:embed="rId2" cstate="print">
             <a:extLst>
               <a:ext uri="{28A0092B-C50C-407E-A947-70E740481C1C}">
                 <a14:useLocalDpi xmlns:a14="http://schemas.microsoft.com/office/drawing/2010/main" val="0"/>
@@ -5733,14 +5720,17 @@
         </p:blipFill>
         <p:spPr>
           <a:xfrm>
-            <a:off x="0" y="0"/>
-            <a:ext cx="5563307" cy="3614738"/>
+            <a:off x="9847811" y="0"/>
+            <a:ext cx="2344189" cy="1523128"/>
           </a:xfrm>
+          <a:prstGeom prst="rect">
+            <a:avLst/>
+          </a:prstGeom>
         </p:spPr>
       </p:pic>
       <p:pic>
         <p:nvPicPr>
-          <p:cNvPr id="7" name="Picture 6"/>
+          <p:cNvPr id="5" name="Picture 4"/>
           <p:cNvPicPr>
             <a:picLocks noChangeAspect="1"/>
           </p:cNvPicPr>
@@ -5760,8 +5750,8 @@
         </p:blipFill>
         <p:spPr>
           <a:xfrm>
-            <a:off x="5186597" y="2917460"/>
-            <a:ext cx="7005402" cy="3940539"/>
+            <a:off x="8155628" y="-132110"/>
+            <a:ext cx="1610577" cy="1787348"/>
           </a:xfrm>
           <a:prstGeom prst="rect">
             <a:avLst/>
@@ -5770,7 +5760,7 @@
       </p:pic>
       <p:pic>
         <p:nvPicPr>
-          <p:cNvPr id="8" name="Picture 7"/>
+          <p:cNvPr id="6" name="Picture 5"/>
           <p:cNvPicPr>
             <a:picLocks noChangeAspect="1"/>
           </p:cNvPicPr>
@@ -5790,8 +5780,8 @@
         </p:blipFill>
         <p:spPr>
           <a:xfrm>
-            <a:off x="5563307" y="-274820"/>
-            <a:ext cx="3124200" cy="3467100"/>
+            <a:off x="5522015" y="389755"/>
+            <a:ext cx="2552007" cy="743618"/>
           </a:xfrm>
           <a:prstGeom prst="rect">
             <a:avLst/>
@@ -5800,14 +5790,14 @@
       </p:pic>
       <p:pic>
         <p:nvPicPr>
-          <p:cNvPr id="9" name="Picture 8"/>
+          <p:cNvPr id="7" name="Content Placeholder 8"/>
           <p:cNvPicPr>
             <a:picLocks noChangeAspect="1"/>
           </p:cNvPicPr>
           <p:nvPr/>
         </p:nvPicPr>
         <p:blipFill>
-          <a:blip r:embed="rId5">
+          <a:blip r:embed="rId5" cstate="print">
             <a:extLst>
               <a:ext uri="{28A0092B-C50C-407E-A947-70E740481C1C}">
                 <a14:useLocalDpi xmlns:a14="http://schemas.microsoft.com/office/drawing/2010/main" val="0"/>
@@ -5820,8 +5810,8 @@
         </p:blipFill>
         <p:spPr>
           <a:xfrm>
-            <a:off x="0" y="3398490"/>
-            <a:ext cx="5186597" cy="1511300"/>
+            <a:off x="8703424" y="5144838"/>
+            <a:ext cx="3424845" cy="1856041"/>
           </a:xfrm>
           <a:prstGeom prst="rect">
             <a:avLst/>
@@ -5830,7 +5820,7 @@
       </p:pic>
       <p:pic>
         <p:nvPicPr>
-          <p:cNvPr id="10" name="Picture 9"/>
+          <p:cNvPr id="8" name="Picture 7"/>
           <p:cNvPicPr>
             <a:picLocks noChangeAspect="1"/>
           </p:cNvPicPr>
@@ -5850,8 +5840,8 @@
         </p:blipFill>
         <p:spPr>
           <a:xfrm>
-            <a:off x="8687507" y="0"/>
-            <a:ext cx="3504492" cy="2917460"/>
+            <a:off x="6692132" y="5377556"/>
+            <a:ext cx="1779380" cy="1480444"/>
           </a:xfrm>
           <a:prstGeom prst="rect">
             <a:avLst/>
@@ -5861,7 +5851,7 @@
     </p:spTree>
     <p:extLst>
       <p:ext uri="{BB962C8B-B14F-4D97-AF65-F5344CB8AC3E}">
-        <p14:creationId xmlns:p14="http://schemas.microsoft.com/office/powerpoint/2010/main" val="320821360"/>
+        <p14:creationId xmlns:p14="http://schemas.microsoft.com/office/powerpoint/2010/main" val="2808291207"/>
       </p:ext>
     </p:extLst>
   </p:cSld>
@@ -5871,149 +5861,7 @@
 </p:sld>
 </file>
 
-<file path=ppt/slides/slide5.xml><?xml version="1.0" encoding="utf-8"?>
-<p:sld xmlns:a="http://schemas.openxmlformats.org/drawingml/2006/main" xmlns:r="http://schemas.openxmlformats.org/officeDocument/2006/relationships" xmlns:p="http://schemas.openxmlformats.org/presentationml/2006/main">
-  <p:cSld>
-    <p:spTree>
-      <p:nvGrpSpPr>
-        <p:cNvPr id="1" name=""/>
-        <p:cNvGrpSpPr/>
-        <p:nvPr/>
-      </p:nvGrpSpPr>
-      <p:grpSpPr>
-        <a:xfrm>
-          <a:off x="0" y="0"/>
-          <a:ext cx="0" cy="0"/>
-          <a:chOff x="0" y="0"/>
-          <a:chExt cx="0" cy="0"/>
-        </a:xfrm>
-      </p:grpSpPr>
-      <p:sp>
-        <p:nvSpPr>
-          <p:cNvPr id="2" name="Title 1"/>
-          <p:cNvSpPr>
-            <a:spLocks noGrp="1"/>
-          </p:cNvSpPr>
-          <p:nvPr>
-            <p:ph type="title"/>
-          </p:nvPr>
-        </p:nvSpPr>
-        <p:spPr/>
-        <p:txBody>
-          <a:bodyPr/>
-          <a:lstStyle/>
-          <a:p>
-            <a:r>
-              <a:rPr lang="en-US" dirty="0" smtClean="0"/>
-              <a:t>Front-end</a:t>
-            </a:r>
-            <a:endParaRPr lang="en-US" dirty="0"/>
-          </a:p>
-        </p:txBody>
-      </p:sp>
-      <p:pic>
-        <p:nvPicPr>
-          <p:cNvPr id="7" name="Picture 6"/>
-          <p:cNvPicPr>
-            <a:picLocks noChangeAspect="1"/>
-          </p:cNvPicPr>
-          <p:nvPr/>
-        </p:nvPicPr>
-        <p:blipFill>
-          <a:blip r:embed="rId2">
-            <a:extLst>
-              <a:ext uri="{28A0092B-C50C-407E-A947-70E740481C1C}">
-                <a14:useLocalDpi xmlns:a14="http://schemas.microsoft.com/office/drawing/2010/main" val="0"/>
-              </a:ext>
-            </a:extLst>
-          </a:blip>
-          <a:stretch>
-            <a:fillRect/>
-          </a:stretch>
-        </p:blipFill>
-        <p:spPr>
-          <a:xfrm>
-            <a:off x="7585023" y="-1"/>
-            <a:ext cx="4606978" cy="4140731"/>
-          </a:xfrm>
-          <a:prstGeom prst="rect">
-            <a:avLst/>
-          </a:prstGeom>
-        </p:spPr>
-      </p:pic>
-      <p:pic>
-        <p:nvPicPr>
-          <p:cNvPr id="9" name="Content Placeholder 8"/>
-          <p:cNvPicPr>
-            <a:picLocks noGrp="1" noChangeAspect="1"/>
-          </p:cNvPicPr>
-          <p:nvPr>
-            <p:ph idx="1"/>
-          </p:nvPr>
-        </p:nvPicPr>
-        <p:blipFill>
-          <a:blip r:embed="rId3">
-            <a:extLst>
-              <a:ext uri="{28A0092B-C50C-407E-A947-70E740481C1C}">
-                <a14:useLocalDpi xmlns:a14="http://schemas.microsoft.com/office/drawing/2010/main" val="0"/>
-              </a:ext>
-            </a:extLst>
-          </a:blip>
-          <a:stretch>
-            <a:fillRect/>
-          </a:stretch>
-        </p:blipFill>
-        <p:spPr>
-          <a:xfrm>
-            <a:off x="-1" y="-1"/>
-            <a:ext cx="7585024" cy="4110586"/>
-          </a:xfrm>
-        </p:spPr>
-      </p:pic>
-      <p:pic>
-        <p:nvPicPr>
-          <p:cNvPr id="10" name="Picture 9"/>
-          <p:cNvPicPr>
-            <a:picLocks noChangeAspect="1"/>
-          </p:cNvPicPr>
-          <p:nvPr/>
-        </p:nvPicPr>
-        <p:blipFill>
-          <a:blip r:embed="rId4">
-            <a:extLst>
-              <a:ext uri="{28A0092B-C50C-407E-A947-70E740481C1C}">
-                <a14:useLocalDpi xmlns:a14="http://schemas.microsoft.com/office/drawing/2010/main" val="0"/>
-              </a:ext>
-            </a:extLst>
-          </a:blip>
-          <a:stretch>
-            <a:fillRect/>
-          </a:stretch>
-        </p:blipFill>
-        <p:spPr>
-          <a:xfrm>
-            <a:off x="4107305" y="3862729"/>
-            <a:ext cx="3312826" cy="2756271"/>
-          </a:xfrm>
-          <a:prstGeom prst="rect">
-            <a:avLst/>
-          </a:prstGeom>
-        </p:spPr>
-      </p:pic>
-    </p:spTree>
-    <p:extLst>
-      <p:ext uri="{BB962C8B-B14F-4D97-AF65-F5344CB8AC3E}">
-        <p14:creationId xmlns:p14="http://schemas.microsoft.com/office/powerpoint/2010/main" val="1233505555"/>
-      </p:ext>
-    </p:extLst>
-  </p:cSld>
-  <p:clrMapOvr>
-    <a:masterClrMapping/>
-  </p:clrMapOvr>
-</p:sld>
-</file>
-
-<file path=ppt/slides/slide6.xml><?xml version="1.0" encoding="utf-8"?>
+<file path=ppt/slides/slide4.xml><?xml version="1.0" encoding="utf-8"?>
 <p:sld xmlns:a="http://schemas.openxmlformats.org/drawingml/2006/main" xmlns:r="http://schemas.openxmlformats.org/officeDocument/2006/relationships" xmlns:p="http://schemas.openxmlformats.org/presentationml/2006/main">
   <p:cSld>
     <p:spTree>
@@ -6138,7 +5986,7 @@
 </p:sld>
 </file>
 
-<file path=ppt/slides/slide7.xml><?xml version="1.0" encoding="utf-8"?>
+<file path=ppt/slides/slide5.xml><?xml version="1.0" encoding="utf-8"?>
 <p:sld xmlns:a="http://schemas.openxmlformats.org/drawingml/2006/main" xmlns:r="http://schemas.openxmlformats.org/officeDocument/2006/relationships" xmlns:p="http://schemas.openxmlformats.org/presentationml/2006/main">
   <p:cSld>
     <p:spTree>
@@ -6220,7 +6068,7 @@
 </p:sld>
 </file>
 
-<file path=ppt/slides/slide8.xml><?xml version="1.0" encoding="utf-8"?>
+<file path=ppt/slides/slide6.xml><?xml version="1.0" encoding="utf-8"?>
 <p:sld xmlns:a="http://schemas.openxmlformats.org/drawingml/2006/main" xmlns:r="http://schemas.openxmlformats.org/officeDocument/2006/relationships" xmlns:p="http://schemas.openxmlformats.org/presentationml/2006/main">
   <p:cSld>
     <p:spTree>
@@ -6392,7 +6240,7 @@
 </p:sld>
 </file>
 
-<file path=ppt/slides/slide9.xml><?xml version="1.0" encoding="utf-8"?>
+<file path=ppt/slides/slide7.xml><?xml version="1.0" encoding="utf-8"?>
 <p:sld xmlns:a="http://schemas.openxmlformats.org/drawingml/2006/main" xmlns:r="http://schemas.openxmlformats.org/officeDocument/2006/relationships" xmlns:p="http://schemas.openxmlformats.org/presentationml/2006/main">
   <p:cSld>
     <p:spTree>
@@ -6434,35 +6282,6 @@
       </p:sp>
       <p:pic>
         <p:nvPicPr>
-          <p:cNvPr id="4" name="Content Placeholder 3"/>
-          <p:cNvPicPr>
-            <a:picLocks noGrp="1" noChangeAspect="1"/>
-          </p:cNvPicPr>
-          <p:nvPr>
-            <p:ph idx="1"/>
-          </p:nvPr>
-        </p:nvPicPr>
-        <p:blipFill>
-          <a:blip r:embed="rId2">
-            <a:extLst>
-              <a:ext uri="{28A0092B-C50C-407E-A947-70E740481C1C}">
-                <a14:useLocalDpi xmlns:a14="http://schemas.microsoft.com/office/drawing/2010/main" val="0"/>
-              </a:ext>
-            </a:extLst>
-          </a:blip>
-          <a:stretch>
-            <a:fillRect/>
-          </a:stretch>
-        </p:blipFill>
-        <p:spPr>
-          <a:xfrm>
-            <a:off x="6160957" y="0"/>
-            <a:ext cx="6031043" cy="4345132"/>
-          </a:xfrm>
-        </p:spPr>
-      </p:pic>
-      <p:pic>
-        <p:nvPicPr>
           <p:cNvPr id="5" name="Content Placeholder 3"/>
           <p:cNvPicPr>
             <a:picLocks noChangeAspect="1"/>
@@ -6470,7 +6289,7 @@
           <p:nvPr/>
         </p:nvPicPr>
         <p:blipFill>
-          <a:blip r:embed="rId3">
+          <a:blip r:embed="rId2">
             <a:extLst>
               <a:ext uri="{28A0092B-C50C-407E-A947-70E740481C1C}">
                 <a14:useLocalDpi xmlns:a14="http://schemas.microsoft.com/office/drawing/2010/main" val="0"/>

</xml_diff>